<commit_message>
more lec 5 materials
</commit_message>
<xml_diff>
--- a/Lecture_Slides/recordings_thumbnail.pptx
+++ b/Lecture_Slides/recordings_thumbnail.pptx
@@ -3953,7 +3953,7 @@
           <a:p>
             <a:r>
               <a:rPr lang="en-US" sz="4000" dirty="0"/>
-              <a:t>Sem.3: Conditional Probability</a:t>
+              <a:t>Lec.5: Random Variables &amp; Their Distributions – 2</a:t>
             </a:r>
             <a:endParaRPr sz="4000" dirty="0"/>
           </a:p>
@@ -3971,7 +3971,7 @@
         </p:nvSpPr>
         <p:spPr>
           <a:xfrm>
-            <a:off x="311700" y="1397151"/>
+            <a:off x="311700" y="1645881"/>
             <a:ext cx="6472800" cy="599700"/>
           </a:xfrm>
           <a:prstGeom prst="rect">

</xml_diff>